<commit_message>
Added notes for Docker. Added authors to all slides.
</commit_message>
<xml_diff>
--- a/3D/NormalEstimation.pptx
+++ b/3D/NormalEstimation.pptx
@@ -3730,18 +3730,31 @@
             </p:custDataLst>
           </p:nvPr>
         </p:nvSpPr>
-        <p:spPr/>
+        <p:spPr>
+          <a:xfrm>
+            <a:off x="1524000" y="5375535"/>
+            <a:ext cx="9144000" cy="376237"/>
+          </a:xfrm>
+        </p:spPr>
         <p:txBody>
           <a:bodyPr>
-            <a:normAutofit fontScale="72500"/>
+            <a:noAutofit/>
           </a:bodyPr>
           <a:p>
             <a:pPr algn="ctr"/>
             <a:r>
-              <a:rPr lang="en-US" altLang="zh-CN" dirty="0"/>
+              <a:rPr lang="en-US" altLang="zh-CN" sz="2000" dirty="0"/>
+              <a:t>Sparks Lu</a:t>
+            </a:r>
+            <a:endParaRPr lang="en-US" altLang="zh-CN" sz="2000" dirty="0"/>
+          </a:p>
+          <a:p>
+            <a:pPr algn="ctr"/>
+            <a:r>
+              <a:rPr lang="en-US" altLang="zh-CN" sz="2000" dirty="0"/>
               <a:t>Last updated: 9/9/2019</a:t>
             </a:r>
-            <a:endParaRPr lang="en-US" altLang="zh-CN" dirty="0"/>
+            <a:endParaRPr lang="en-US" altLang="zh-CN" sz="2000" dirty="0"/>
           </a:p>
         </p:txBody>
       </p:sp>

</xml_diff>